<commit_message>
enhanced four corner model v0.92
</commit_message>
<xml_diff>
--- a/saturn/enhanced-four-corner-model.pptx
+++ b/saturn/enhanced-four-corner-model.pptx
@@ -288,7 +288,7 @@
           <a:p>
             <a:fld id="{FC080E38-6FF2-48B3-BDAB-4FA23B840E92}" type="datetimeFigureOut">
               <a:rPr lang="en-US" smtClean="0"/>
-              <a:t>2019-08-19</a:t>
+              <a:t>2019-09-02</a:t>
             </a:fld>
             <a:endParaRPr lang="en-US"/>
           </a:p>
@@ -458,7 +458,7 @@
           <a:p>
             <a:fld id="{FC080E38-6FF2-48B3-BDAB-4FA23B840E92}" type="datetimeFigureOut">
               <a:rPr lang="en-US" smtClean="0"/>
-              <a:t>2019-08-19</a:t>
+              <a:t>2019-09-02</a:t>
             </a:fld>
             <a:endParaRPr lang="en-US"/>
           </a:p>
@@ -638,7 +638,7 @@
           <a:p>
             <a:fld id="{FC080E38-6FF2-48B3-BDAB-4FA23B840E92}" type="datetimeFigureOut">
               <a:rPr lang="en-US" smtClean="0"/>
-              <a:t>2019-08-19</a:t>
+              <a:t>2019-09-02</a:t>
             </a:fld>
             <a:endParaRPr lang="en-US"/>
           </a:p>
@@ -808,7 +808,7 @@
           <a:p>
             <a:fld id="{FC080E38-6FF2-48B3-BDAB-4FA23B840E92}" type="datetimeFigureOut">
               <a:rPr lang="en-US" smtClean="0"/>
-              <a:t>2019-08-19</a:t>
+              <a:t>2019-09-02</a:t>
             </a:fld>
             <a:endParaRPr lang="en-US"/>
           </a:p>
@@ -1054,7 +1054,7 @@
           <a:p>
             <a:fld id="{FC080E38-6FF2-48B3-BDAB-4FA23B840E92}" type="datetimeFigureOut">
               <a:rPr lang="en-US" smtClean="0"/>
-              <a:t>2019-08-19</a:t>
+              <a:t>2019-09-02</a:t>
             </a:fld>
             <a:endParaRPr lang="en-US"/>
           </a:p>
@@ -1342,7 +1342,7 @@
           <a:p>
             <a:fld id="{FC080E38-6FF2-48B3-BDAB-4FA23B840E92}" type="datetimeFigureOut">
               <a:rPr lang="en-US" smtClean="0"/>
-              <a:t>2019-08-19</a:t>
+              <a:t>2019-09-02</a:t>
             </a:fld>
             <a:endParaRPr lang="en-US"/>
           </a:p>
@@ -1764,7 +1764,7 @@
           <a:p>
             <a:fld id="{FC080E38-6FF2-48B3-BDAB-4FA23B840E92}" type="datetimeFigureOut">
               <a:rPr lang="en-US" smtClean="0"/>
-              <a:t>2019-08-19</a:t>
+              <a:t>2019-09-02</a:t>
             </a:fld>
             <a:endParaRPr lang="en-US"/>
           </a:p>
@@ -1882,7 +1882,7 @@
           <a:p>
             <a:fld id="{FC080E38-6FF2-48B3-BDAB-4FA23B840E92}" type="datetimeFigureOut">
               <a:rPr lang="en-US" smtClean="0"/>
-              <a:t>2019-08-19</a:t>
+              <a:t>2019-09-02</a:t>
             </a:fld>
             <a:endParaRPr lang="en-US"/>
           </a:p>
@@ -1977,7 +1977,7 @@
           <a:p>
             <a:fld id="{FC080E38-6FF2-48B3-BDAB-4FA23B840E92}" type="datetimeFigureOut">
               <a:rPr lang="en-US" smtClean="0"/>
-              <a:t>2019-08-19</a:t>
+              <a:t>2019-09-02</a:t>
             </a:fld>
             <a:endParaRPr lang="en-US"/>
           </a:p>
@@ -2254,7 +2254,7 @@
           <a:p>
             <a:fld id="{FC080E38-6FF2-48B3-BDAB-4FA23B840E92}" type="datetimeFigureOut">
               <a:rPr lang="en-US" smtClean="0"/>
-              <a:t>2019-08-19</a:t>
+              <a:t>2019-09-02</a:t>
             </a:fld>
             <a:endParaRPr lang="en-US"/>
           </a:p>
@@ -2507,7 +2507,7 @@
           <a:p>
             <a:fld id="{FC080E38-6FF2-48B3-BDAB-4FA23B840E92}" type="datetimeFigureOut">
               <a:rPr lang="en-US" smtClean="0"/>
-              <a:t>2019-08-19</a:t>
+              <a:t>2019-09-02</a:t>
             </a:fld>
             <a:endParaRPr lang="en-US"/>
           </a:p>
@@ -2720,7 +2720,7 @@
           <a:p>
             <a:fld id="{FC080E38-6FF2-48B3-BDAB-4FA23B840E92}" type="datetimeFigureOut">
               <a:rPr lang="en-US" smtClean="0"/>
-              <a:t>2019-08-19</a:t>
+              <a:t>2019-09-02</a:t>
             </a:fld>
             <a:endParaRPr lang="en-US"/>
           </a:p>
@@ -3603,14 +3603,12 @@
       <p:cxnSp>
         <p:nvCxnSpPr>
           <p:cNvPr id="35" name="Straight Connector 34"/>
-          <p:cNvCxnSpPr>
-            <a:stCxn id="179" idx="0"/>
-          </p:cNvCxnSpPr>
+          <p:cNvCxnSpPr/>
           <p:nvPr/>
         </p:nvCxnSpPr>
         <p:spPr>
           <a:xfrm flipH="1" flipV="1">
-            <a:off x="3692992" y="2826514"/>
+            <a:off x="3707903" y="2826514"/>
             <a:ext cx="1" cy="493579"/>
           </a:xfrm>
           <a:prstGeom prst="line">
@@ -3684,7 +3682,7 @@
         </p:nvCxnSpPr>
         <p:spPr>
           <a:xfrm flipH="1">
-            <a:off x="3113886" y="5748645"/>
+            <a:off x="3113886" y="5668709"/>
             <a:ext cx="3060000" cy="0"/>
           </a:xfrm>
           <a:prstGeom prst="straightConnector1">
@@ -3919,7 +3917,7 @@
         </p:nvSpPr>
         <p:spPr>
           <a:xfrm>
-            <a:off x="4211959" y="5453152"/>
+            <a:off x="4211959" y="5373216"/>
             <a:ext cx="841898" cy="307777"/>
           </a:xfrm>
           <a:prstGeom prst="rect">
@@ -7825,14 +7823,7 @@
                 <a:latin typeface="Arial" panose="020B0604020202020204" pitchFamily="34" charset="0"/>
                 <a:cs typeface="Arial" panose="020B0604020202020204" pitchFamily="34" charset="0"/>
               </a:rPr>
-              <a:t>pdated JSON </a:t>
-            </a:r>
-            <a:r>
-              <a:rPr lang="en-US" sz="1400" i="1" dirty="0" smtClean="0">
-                <a:latin typeface="Arial" panose="020B0604020202020204" pitchFamily="34" charset="0"/>
-                <a:cs typeface="Arial" panose="020B0604020202020204" pitchFamily="34" charset="0"/>
-              </a:rPr>
-              <a:t>Authority Objects </a:t>
+              <a:t>pdated JSON Authority Objects </a:t>
             </a:r>
             <a:r>
               <a:rPr lang="en-US" sz="1400" dirty="0" smtClean="0">
@@ -8987,7 +8978,7 @@
                 <a:latin typeface="Arial" panose="020B0604020202020204" pitchFamily="34" charset="0"/>
                 <a:cs typeface="Arial" panose="020B0604020202020204" pitchFamily="34" charset="0"/>
               </a:rPr>
-              <a:t>V0.91, </a:t>
+              <a:t>V0.92, </a:t>
             </a:r>
             <a:r>
               <a:rPr lang="en-US" sz="800" dirty="0" err="1" smtClean="0">
@@ -9008,7 +8999,7 @@
                 <a:latin typeface="Arial" panose="020B0604020202020204" pitchFamily="34" charset="0"/>
                 <a:cs typeface="Arial" panose="020B0604020202020204" pitchFamily="34" charset="0"/>
               </a:rPr>
-              <a:t>2019-08-19</a:t>
+              <a:t>2019-09-02</a:t>
             </a:r>
             <a:endParaRPr lang="en-US" sz="800" dirty="0">
               <a:latin typeface="Arial" panose="020B0604020202020204" pitchFamily="34" charset="0"/>
@@ -9654,6 +9645,107 @@
               <a:solidFill>
                 <a:schemeClr val="tx1"/>
               </a:solidFill>
+              <a:latin typeface="Arial" panose="020B0604020202020204" pitchFamily="34" charset="0"/>
+              <a:cs typeface="Arial" panose="020B0604020202020204" pitchFamily="34" charset="0"/>
+            </a:endParaRPr>
+          </a:p>
+        </p:txBody>
+      </p:sp>
+      <p:sp>
+        <p:nvSpPr>
+          <p:cNvPr id="9" name="Left-Right Arrow 8"/>
+          <p:cNvSpPr/>
+          <p:nvPr/>
+        </p:nvSpPr>
+        <p:spPr>
+          <a:xfrm>
+            <a:off x="3113886" y="5738938"/>
+            <a:ext cx="3060000" cy="175030"/>
+          </a:xfrm>
+          <a:prstGeom prst="leftRightArrow">
+            <a:avLst/>
+          </a:prstGeom>
+          <a:gradFill>
+            <a:gsLst>
+              <a:gs pos="0">
+                <a:srgbClr val="FBEAC7"/>
+              </a:gs>
+              <a:gs pos="17999">
+                <a:srgbClr val="FEE7F2"/>
+              </a:gs>
+              <a:gs pos="36000">
+                <a:srgbClr val="FAC77D"/>
+              </a:gs>
+              <a:gs pos="61000">
+                <a:srgbClr val="FBA97D"/>
+              </a:gs>
+              <a:gs pos="82001">
+                <a:srgbClr val="FBD49C"/>
+              </a:gs>
+              <a:gs pos="100000">
+                <a:srgbClr val="FEE7F2"/>
+              </a:gs>
+            </a:gsLst>
+            <a:lin ang="5400000" scaled="0"/>
+          </a:gradFill>
+          <a:ln w="6350"/>
+        </p:spPr>
+        <p:style>
+          <a:lnRef idx="2">
+            <a:schemeClr val="accent1">
+              <a:shade val="50000"/>
+            </a:schemeClr>
+          </a:lnRef>
+          <a:fillRef idx="1">
+            <a:schemeClr val="accent1"/>
+          </a:fillRef>
+          <a:effectRef idx="0">
+            <a:schemeClr val="accent1"/>
+          </a:effectRef>
+          <a:fontRef idx="minor">
+            <a:schemeClr val="lt1"/>
+          </a:fontRef>
+        </p:style>
+        <p:txBody>
+          <a:bodyPr rtlCol="0" anchor="ctr"/>
+          <a:lstStyle/>
+          <a:p>
+            <a:pPr algn="ctr"/>
+            <a:endParaRPr lang="en-US"/>
+          </a:p>
+        </p:txBody>
+      </p:sp>
+      <p:sp>
+        <p:nvSpPr>
+          <p:cNvPr id="135" name="TextBox 134"/>
+          <p:cNvSpPr txBox="1"/>
+          <p:nvPr/>
+        </p:nvSpPr>
+        <p:spPr>
+          <a:xfrm>
+            <a:off x="3635896" y="5876777"/>
+            <a:ext cx="2137124" cy="307777"/>
+          </a:xfrm>
+          <a:prstGeom prst="rect">
+            <a:avLst/>
+          </a:prstGeom>
+          <a:noFill/>
+        </p:spPr>
+        <p:txBody>
+          <a:bodyPr wrap="none" rtlCol="0">
+            <a:spAutoFit/>
+          </a:bodyPr>
+          <a:lstStyle/>
+          <a:p>
+            <a:pPr algn="ctr"/>
+            <a:r>
+              <a:rPr lang="en-US" sz="1400" dirty="0" smtClean="0">
+                <a:latin typeface="Arial" panose="020B0604020202020204" pitchFamily="34" charset="0"/>
+                <a:cs typeface="Arial" panose="020B0604020202020204" pitchFamily="34" charset="0"/>
+              </a:rPr>
+              <a:t>Existing “Payment Rails”</a:t>
+            </a:r>
+            <a:endParaRPr lang="en-US" sz="1400" dirty="0">
               <a:latin typeface="Arial" panose="020B0604020202020204" pitchFamily="34" charset="0"/>
               <a:cs typeface="Arial" panose="020B0604020202020204" pitchFamily="34" charset="0"/>
             </a:endParaRPr>

</xml_diff>

<commit_message>
Enhanced Four Corner Model 0.93
</commit_message>
<xml_diff>
--- a/saturn/enhanced-four-corner-model.pptx
+++ b/saturn/enhanced-four-corner-model.pptx
@@ -288,7 +288,7 @@
           <a:p>
             <a:fld id="{FC080E38-6FF2-48B3-BDAB-4FA23B840E92}" type="datetimeFigureOut">
               <a:rPr lang="en-US" smtClean="0"/>
-              <a:t>2019-09-02</a:t>
+              <a:t>2019-09-06</a:t>
             </a:fld>
             <a:endParaRPr lang="en-US"/>
           </a:p>
@@ -458,7 +458,7 @@
           <a:p>
             <a:fld id="{FC080E38-6FF2-48B3-BDAB-4FA23B840E92}" type="datetimeFigureOut">
               <a:rPr lang="en-US" smtClean="0"/>
-              <a:t>2019-09-02</a:t>
+              <a:t>2019-09-06</a:t>
             </a:fld>
             <a:endParaRPr lang="en-US"/>
           </a:p>
@@ -638,7 +638,7 @@
           <a:p>
             <a:fld id="{FC080E38-6FF2-48B3-BDAB-4FA23B840E92}" type="datetimeFigureOut">
               <a:rPr lang="en-US" smtClean="0"/>
-              <a:t>2019-09-02</a:t>
+              <a:t>2019-09-06</a:t>
             </a:fld>
             <a:endParaRPr lang="en-US"/>
           </a:p>
@@ -808,7 +808,7 @@
           <a:p>
             <a:fld id="{FC080E38-6FF2-48B3-BDAB-4FA23B840E92}" type="datetimeFigureOut">
               <a:rPr lang="en-US" smtClean="0"/>
-              <a:t>2019-09-02</a:t>
+              <a:t>2019-09-06</a:t>
             </a:fld>
             <a:endParaRPr lang="en-US"/>
           </a:p>
@@ -1054,7 +1054,7 @@
           <a:p>
             <a:fld id="{FC080E38-6FF2-48B3-BDAB-4FA23B840E92}" type="datetimeFigureOut">
               <a:rPr lang="en-US" smtClean="0"/>
-              <a:t>2019-09-02</a:t>
+              <a:t>2019-09-06</a:t>
             </a:fld>
             <a:endParaRPr lang="en-US"/>
           </a:p>
@@ -1342,7 +1342,7 @@
           <a:p>
             <a:fld id="{FC080E38-6FF2-48B3-BDAB-4FA23B840E92}" type="datetimeFigureOut">
               <a:rPr lang="en-US" smtClean="0"/>
-              <a:t>2019-09-02</a:t>
+              <a:t>2019-09-06</a:t>
             </a:fld>
             <a:endParaRPr lang="en-US"/>
           </a:p>
@@ -1764,7 +1764,7 @@
           <a:p>
             <a:fld id="{FC080E38-6FF2-48B3-BDAB-4FA23B840E92}" type="datetimeFigureOut">
               <a:rPr lang="en-US" smtClean="0"/>
-              <a:t>2019-09-02</a:t>
+              <a:t>2019-09-06</a:t>
             </a:fld>
             <a:endParaRPr lang="en-US"/>
           </a:p>
@@ -1882,7 +1882,7 @@
           <a:p>
             <a:fld id="{FC080E38-6FF2-48B3-BDAB-4FA23B840E92}" type="datetimeFigureOut">
               <a:rPr lang="en-US" smtClean="0"/>
-              <a:t>2019-09-02</a:t>
+              <a:t>2019-09-06</a:t>
             </a:fld>
             <a:endParaRPr lang="en-US"/>
           </a:p>
@@ -1977,7 +1977,7 @@
           <a:p>
             <a:fld id="{FC080E38-6FF2-48B3-BDAB-4FA23B840E92}" type="datetimeFigureOut">
               <a:rPr lang="en-US" smtClean="0"/>
-              <a:t>2019-09-02</a:t>
+              <a:t>2019-09-06</a:t>
             </a:fld>
             <a:endParaRPr lang="en-US"/>
           </a:p>
@@ -2254,7 +2254,7 @@
           <a:p>
             <a:fld id="{FC080E38-6FF2-48B3-BDAB-4FA23B840E92}" type="datetimeFigureOut">
               <a:rPr lang="en-US" smtClean="0"/>
-              <a:t>2019-09-02</a:t>
+              <a:t>2019-09-06</a:t>
             </a:fld>
             <a:endParaRPr lang="en-US"/>
           </a:p>
@@ -2507,7 +2507,7 @@
           <a:p>
             <a:fld id="{FC080E38-6FF2-48B3-BDAB-4FA23B840E92}" type="datetimeFigureOut">
               <a:rPr lang="en-US" smtClean="0"/>
-              <a:t>2019-09-02</a:t>
+              <a:t>2019-09-06</a:t>
             </a:fld>
             <a:endParaRPr lang="en-US"/>
           </a:p>
@@ -2720,7 +2720,7 @@
           <a:p>
             <a:fld id="{FC080E38-6FF2-48B3-BDAB-4FA23B840E92}" type="datetimeFigureOut">
               <a:rPr lang="en-US" smtClean="0"/>
-              <a:t>2019-09-02</a:t>
+              <a:t>2019-09-06</a:t>
             </a:fld>
             <a:endParaRPr lang="en-US"/>
           </a:p>
@@ -3103,7 +3103,7 @@
         </p:nvGrpSpPr>
         <p:grpSpPr>
           <a:xfrm>
-            <a:off x="1115616" y="1666918"/>
+            <a:off x="899592" y="1666918"/>
             <a:ext cx="1273991" cy="825978"/>
             <a:chOff x="1065761" y="1512050"/>
             <a:chExt cx="1273991" cy="825978"/>
@@ -3275,7 +3275,7 @@
           </p:nvSpPr>
           <p:spPr>
             <a:xfrm>
-              <a:off x="1102536" y="1512050"/>
+              <a:off x="1071623" y="1512050"/>
               <a:ext cx="252239" cy="215444"/>
             </a:xfrm>
             <a:prstGeom prst="rect">
@@ -3682,7 +3682,7 @@
         </p:nvCxnSpPr>
         <p:spPr>
           <a:xfrm flipH="1">
-            <a:off x="3113886" y="5668709"/>
+            <a:off x="3102162" y="5662847"/>
             <a:ext cx="3060000" cy="0"/>
           </a:xfrm>
           <a:prstGeom prst="straightConnector1">
@@ -3692,7 +3692,7 @@
             <a:solidFill>
               <a:schemeClr val="accent1"/>
             </a:solidFill>
-            <a:prstDash val="sysDash"/>
+            <a:prstDash val="sysDot"/>
             <a:headEnd type="triangle" w="sm" len="sm"/>
             <a:tailEnd type="triangle" w="sm" len="sm"/>
           </a:ln>
@@ -3851,7 +3851,7 @@
             <a:solidFill>
               <a:schemeClr val="accent1"/>
             </a:solidFill>
-            <a:prstDash val="sysDash"/>
+            <a:prstDash val="sysDot"/>
             <a:headEnd type="triangle" w="sm" len="sm"/>
             <a:tailEnd type="triangle" w="sm" len="sm"/>
           </a:ln>
@@ -3889,7 +3889,7 @@
             <a:solidFill>
               <a:schemeClr val="accent1"/>
             </a:solidFill>
-            <a:prstDash val="sysDash"/>
+            <a:prstDash val="sysDot"/>
             <a:headEnd type="triangle" w="sm" len="sm"/>
             <a:tailEnd type="triangle" w="sm" len="sm"/>
           </a:ln>
@@ -3934,12 +3934,18 @@
             <a:pPr algn="ctr"/>
             <a:r>
               <a:rPr lang="en-US" sz="1400" i="1" dirty="0" smtClean="0">
+                <a:solidFill>
+                  <a:schemeClr val="accent1"/>
+                </a:solidFill>
                 <a:latin typeface="Arial" panose="020B0604020202020204" pitchFamily="34" charset="0"/>
                 <a:cs typeface="Arial" panose="020B0604020202020204" pitchFamily="34" charset="0"/>
               </a:rPr>
               <a:t>Relation</a:t>
             </a:r>
             <a:endParaRPr lang="en-US" sz="1400" i="1" dirty="0">
+              <a:solidFill>
+                <a:schemeClr val="accent1"/>
+              </a:solidFill>
               <a:latin typeface="Arial" panose="020B0604020202020204" pitchFamily="34" charset="0"/>
               <a:cs typeface="Arial" panose="020B0604020202020204" pitchFamily="34" charset="0"/>
             </a:endParaRPr>
@@ -3971,12 +3977,18 @@
             <a:pPr algn="ctr"/>
             <a:r>
               <a:rPr lang="en-US" sz="1400" i="1" dirty="0" smtClean="0">
+                <a:solidFill>
+                  <a:schemeClr val="accent1"/>
+                </a:solidFill>
                 <a:latin typeface="Arial" panose="020B0604020202020204" pitchFamily="34" charset="0"/>
                 <a:cs typeface="Arial" panose="020B0604020202020204" pitchFamily="34" charset="0"/>
               </a:rPr>
               <a:t>Relation</a:t>
             </a:r>
             <a:endParaRPr lang="en-US" sz="1400" i="1" dirty="0">
+              <a:solidFill>
+                <a:schemeClr val="accent1"/>
+              </a:solidFill>
               <a:latin typeface="Arial" panose="020B0604020202020204" pitchFamily="34" charset="0"/>
               <a:cs typeface="Arial" panose="020B0604020202020204" pitchFamily="34" charset="0"/>
             </a:endParaRPr>
@@ -4008,12 +4020,18 @@
             <a:pPr algn="ctr"/>
             <a:r>
               <a:rPr lang="en-US" sz="1400" i="1" dirty="0" smtClean="0">
+                <a:solidFill>
+                  <a:schemeClr val="accent1"/>
+                </a:solidFill>
                 <a:latin typeface="Arial" panose="020B0604020202020204" pitchFamily="34" charset="0"/>
                 <a:cs typeface="Arial" panose="020B0604020202020204" pitchFamily="34" charset="0"/>
               </a:rPr>
               <a:t>Relation</a:t>
             </a:r>
             <a:endParaRPr lang="en-US" sz="1400" i="1" dirty="0">
+              <a:solidFill>
+                <a:schemeClr val="accent1"/>
+              </a:solidFill>
               <a:latin typeface="Arial" panose="020B0604020202020204" pitchFamily="34" charset="0"/>
               <a:cs typeface="Arial" panose="020B0604020202020204" pitchFamily="34" charset="0"/>
             </a:endParaRPr>
@@ -5967,7 +5985,7 @@
         </p:blipFill>
         <p:spPr bwMode="auto">
           <a:xfrm rot="19980000">
-            <a:off x="2029254" y="3298383"/>
+            <a:off x="1896963" y="3217189"/>
             <a:ext cx="360040" cy="356341"/>
           </a:xfrm>
           <a:prstGeom prst="rect">
@@ -6006,8 +6024,8 @@
         </p:nvSpPr>
         <p:spPr>
           <a:xfrm>
-            <a:off x="1566541" y="2420887"/>
-            <a:ext cx="1150097" cy="3088505"/>
+            <a:off x="1413521" y="2420887"/>
+            <a:ext cx="1303117" cy="3088505"/>
           </a:xfrm>
           <a:custGeom>
             <a:avLst/>
@@ -6202,7 +6220,7 @@
         </p:nvSpPr>
         <p:spPr>
           <a:xfrm rot="16200000">
-            <a:off x="599035" y="3296304"/>
+            <a:off x="460185" y="3296304"/>
             <a:ext cx="1628972" cy="307777"/>
           </a:xfrm>
           <a:prstGeom prst="rect">
@@ -6341,116 +6359,6 @@
           </p:spPr>
         </p:pic>
       </p:grpSp>
-      <p:grpSp>
-        <p:nvGrpSpPr>
-          <p:cNvPr id="169" name="Group 168"/>
-          <p:cNvGrpSpPr/>
-          <p:nvPr/>
-        </p:nvGrpSpPr>
-        <p:grpSpPr>
-          <a:xfrm>
-            <a:off x="6967878" y="5445224"/>
-            <a:ext cx="445844" cy="603379"/>
-            <a:chOff x="8232155" y="587661"/>
-            <a:chExt cx="445844" cy="603379"/>
-          </a:xfrm>
-        </p:grpSpPr>
-        <p:pic>
-          <p:nvPicPr>
-            <p:cNvPr id="170" name="Picture 169"/>
-            <p:cNvPicPr>
-              <a:picLocks noChangeAspect="1" noChangeArrowheads="1"/>
-            </p:cNvPicPr>
-            <p:nvPr/>
-          </p:nvPicPr>
-          <p:blipFill>
-            <a:blip r:embed="rId7" cstate="print">
-              <a:extLst>
-                <a:ext uri="{28A0092B-C50C-407E-A947-70E740481C1C}">
-                  <a14:useLocalDpi xmlns:a14="http://schemas.microsoft.com/office/drawing/2010/main" val="0"/>
-                </a:ext>
-              </a:extLst>
-            </a:blip>
-            <a:srcRect/>
-            <a:stretch>
-              <a:fillRect/>
-            </a:stretch>
-          </p:blipFill>
-          <p:spPr bwMode="auto">
-            <a:xfrm>
-              <a:off x="8232155" y="796517"/>
-              <a:ext cx="324060" cy="394523"/>
-            </a:xfrm>
-            <a:prstGeom prst="rect">
-              <a:avLst/>
-            </a:prstGeom>
-            <a:noFill/>
-            <a:extLst>
-              <a:ext uri="{909E8E84-426E-40DD-AFC4-6F175D3DCCD1}">
-                <a14:hiddenFill xmlns:a14="http://schemas.microsoft.com/office/drawing/2010/main">
-                  <a:solidFill>
-                    <a:srgbClr val="FFFFFF"/>
-                  </a:solidFill>
-                </a14:hiddenFill>
-              </a:ext>
-            </a:extLst>
-          </p:spPr>
-        </p:pic>
-        <p:pic>
-          <p:nvPicPr>
-            <p:cNvPr id="171" name="Picture 8" descr="key"/>
-            <p:cNvPicPr>
-              <a:picLocks noChangeAspect="1" noChangeArrowheads="1"/>
-            </p:cNvPicPr>
-            <p:nvPr/>
-          </p:nvPicPr>
-          <p:blipFill>
-            <a:blip r:embed="rId8">
-              <a:extLst>
-                <a:ext uri="{28A0092B-C50C-407E-A947-70E740481C1C}">
-                  <a14:useLocalDpi xmlns:a14="http://schemas.microsoft.com/office/drawing/2010/main" val="0"/>
-                </a:ext>
-              </a:extLst>
-            </a:blip>
-            <a:srcRect/>
-            <a:stretch>
-              <a:fillRect/>
-            </a:stretch>
-          </p:blipFill>
-          <p:spPr bwMode="auto">
-            <a:xfrm>
-              <a:off x="8317959" y="587661"/>
-              <a:ext cx="360040" cy="356341"/>
-            </a:xfrm>
-            <a:prstGeom prst="rect">
-              <a:avLst/>
-            </a:prstGeom>
-            <a:noFill/>
-            <a:ln>
-              <a:noFill/>
-            </a:ln>
-            <a:extLst>
-              <a:ext uri="{909E8E84-426E-40DD-AFC4-6F175D3DCCD1}">
-                <a14:hiddenFill xmlns:a14="http://schemas.microsoft.com/office/drawing/2010/main">
-                  <a:solidFill>
-                    <a:srgbClr val="FFFFFF"/>
-                  </a:solidFill>
-                </a14:hiddenFill>
-              </a:ext>
-              <a:ext uri="{91240B29-F687-4F45-9708-019B960494DF}">
-                <a14:hiddenLine xmlns:a14="http://schemas.microsoft.com/office/drawing/2010/main" w="9525">
-                  <a:solidFill>
-                    <a:srgbClr val="000000"/>
-                  </a:solidFill>
-                  <a:miter lim="800000"/>
-                  <a:headEnd/>
-                  <a:tailEnd/>
-                </a14:hiddenLine>
-              </a:ext>
-            </a:extLst>
-          </p:spPr>
-        </p:pic>
-      </p:grpSp>
       <p:cxnSp>
         <p:nvCxnSpPr>
           <p:cNvPr id="11" name="Straight Connector 10"/>
@@ -6462,8 +6370,8 @@
         </p:nvCxnSpPr>
         <p:spPr>
           <a:xfrm>
-            <a:off x="2544700" y="2103049"/>
-            <a:ext cx="164543" cy="1105571"/>
+            <a:off x="2328676" y="2103049"/>
+            <a:ext cx="380567" cy="1105571"/>
           </a:xfrm>
           <a:prstGeom prst="line">
             <a:avLst/>
@@ -7771,8 +7679,8 @@
         </p:nvSpPr>
         <p:spPr>
           <a:xfrm>
-            <a:off x="4139952" y="1340768"/>
-            <a:ext cx="4320480" cy="954107"/>
+            <a:off x="3993414" y="1297586"/>
+            <a:ext cx="4491055" cy="954107"/>
           </a:xfrm>
           <a:prstGeom prst="rect">
             <a:avLst/>
@@ -8335,7 +8243,7 @@
         </p:nvGrpSpPr>
         <p:grpSpPr>
           <a:xfrm>
-            <a:off x="1907704" y="1450894"/>
+            <a:off x="1691680" y="1450894"/>
             <a:ext cx="1273991" cy="825978"/>
             <a:chOff x="1065761" y="1512050"/>
             <a:chExt cx="1273991" cy="825978"/>
@@ -8507,7 +8415,7 @@
           </p:nvSpPr>
           <p:spPr>
             <a:xfrm>
-              <a:off x="1102536" y="1512050"/>
+              <a:off x="1077485" y="1512050"/>
               <a:ext cx="252239" cy="215444"/>
             </a:xfrm>
             <a:prstGeom prst="rect">
@@ -8564,7 +8472,7 @@
         </p:nvGrpSpPr>
         <p:grpSpPr>
           <a:xfrm>
-            <a:off x="2749647" y="1268760"/>
+            <a:off x="2533623" y="1268760"/>
             <a:ext cx="1273991" cy="825978"/>
             <a:chOff x="1065761" y="1512050"/>
             <a:chExt cx="1273991" cy="825978"/>
@@ -8736,7 +8644,7 @@
           </p:nvSpPr>
           <p:spPr>
             <a:xfrm>
-              <a:off x="1102536" y="1512050"/>
+              <a:off x="1076190" y="1512050"/>
               <a:ext cx="252239" cy="215444"/>
             </a:xfrm>
             <a:prstGeom prst="rect">
@@ -8978,7 +8886,7 @@
                 <a:latin typeface="Arial" panose="020B0604020202020204" pitchFamily="34" charset="0"/>
                 <a:cs typeface="Arial" panose="020B0604020202020204" pitchFamily="34" charset="0"/>
               </a:rPr>
-              <a:t>V0.92, </a:t>
+              <a:t>V0.93, </a:t>
             </a:r>
             <a:r>
               <a:rPr lang="en-US" sz="800" dirty="0" err="1" smtClean="0">
@@ -8999,7 +8907,7 @@
                 <a:latin typeface="Arial" panose="020B0604020202020204" pitchFamily="34" charset="0"/>
                 <a:cs typeface="Arial" panose="020B0604020202020204" pitchFamily="34" charset="0"/>
               </a:rPr>
-              <a:t>2019-09-02</a:t>
+              <a:t>2019-09-06</a:t>
             </a:r>
             <a:endParaRPr lang="en-US" sz="800" dirty="0">
               <a:latin typeface="Arial" panose="020B0604020202020204" pitchFamily="34" charset="0"/>
@@ -9017,7 +8925,7 @@
         <p:spPr>
           <a:xfrm>
             <a:off x="1963698" y="6453336"/>
-            <a:ext cx="5272597" cy="246221"/>
+            <a:ext cx="5560630" cy="246221"/>
           </a:xfrm>
           <a:prstGeom prst="rect">
             <a:avLst/>
@@ -9043,7 +8951,7 @@
           </a:effectLst>
         </p:spPr>
         <p:txBody>
-          <a:bodyPr wrap="none" rtlCol="0">
+          <a:bodyPr wrap="square" rtlCol="0">
             <a:spAutoFit/>
           </a:bodyPr>
           <a:lstStyle/>
@@ -9053,7 +8961,21 @@
                 <a:latin typeface="Arial" panose="020B0604020202020204" pitchFamily="34" charset="0"/>
                 <a:cs typeface="Arial" panose="020B0604020202020204" pitchFamily="34" charset="0"/>
               </a:rPr>
-              <a:t>Note: this drawing is simplified, finer details as well as </a:t>
+              <a:t>Note: this drawing is simplified, </a:t>
+            </a:r>
+            <a:r>
+              <a:rPr lang="en-US" sz="1000" dirty="0" smtClean="0">
+                <a:latin typeface="Arial" panose="020B0604020202020204" pitchFamily="34" charset="0"/>
+                <a:cs typeface="Arial" panose="020B0604020202020204" pitchFamily="34" charset="0"/>
+              </a:rPr>
+              <a:t>succeeding steps as </a:t>
+            </a:r>
+            <a:r>
+              <a:rPr lang="en-US" sz="1000" dirty="0" smtClean="0">
+                <a:latin typeface="Arial" panose="020B0604020202020204" pitchFamily="34" charset="0"/>
+                <a:cs typeface="Arial" panose="020B0604020202020204" pitchFamily="34" charset="0"/>
+              </a:rPr>
+              <a:t>well as </a:t>
             </a:r>
             <a:r>
               <a:rPr lang="en-US" sz="1000" dirty="0" smtClean="0">
@@ -9659,7 +9581,7 @@
         </p:nvSpPr>
         <p:spPr>
           <a:xfrm>
-            <a:off x="3113886" y="5738938"/>
+            <a:off x="3102162" y="5733076"/>
             <a:ext cx="3060000" cy="175030"/>
           </a:xfrm>
           <a:prstGeom prst="leftRightArrow">
@@ -9689,6 +9611,13 @@
             <a:lin ang="5400000" scaled="0"/>
           </a:gradFill>
           <a:ln w="6350"/>
+          <a:effectLst>
+            <a:outerShdw blurRad="50800" dist="38100" dir="2700000" algn="tl" rotWithShape="0">
+              <a:prstClr val="black">
+                <a:alpha val="40000"/>
+              </a:prstClr>
+            </a:outerShdw>
+          </a:effectLst>
         </p:spPr>
         <p:style>
           <a:lnRef idx="2">
@@ -9749,6 +9678,375 @@
               <a:latin typeface="Arial" panose="020B0604020202020204" pitchFamily="34" charset="0"/>
               <a:cs typeface="Arial" panose="020B0604020202020204" pitchFamily="34" charset="0"/>
             </a:endParaRPr>
+          </a:p>
+        </p:txBody>
+      </p:sp>
+      <p:pic>
+        <p:nvPicPr>
+          <p:cNvPr id="136" name="Picture 8" descr="key"/>
+          <p:cNvPicPr>
+            <a:picLocks noChangeAspect="1" noChangeArrowheads="1"/>
+          </p:cNvPicPr>
+          <p:nvPr/>
+        </p:nvPicPr>
+        <p:blipFill>
+          <a:blip r:embed="rId8">
+            <a:extLst>
+              <a:ext uri="{28A0092B-C50C-407E-A947-70E740481C1C}">
+                <a14:useLocalDpi xmlns:a14="http://schemas.microsoft.com/office/drawing/2010/main" val="0"/>
+              </a:ext>
+            </a:extLst>
+          </a:blip>
+          <a:srcRect/>
+          <a:stretch>
+            <a:fillRect/>
+          </a:stretch>
+        </p:blipFill>
+        <p:spPr bwMode="auto">
+          <a:xfrm>
+            <a:off x="6946628" y="5589240"/>
+            <a:ext cx="360040" cy="356341"/>
+          </a:xfrm>
+          <a:prstGeom prst="rect">
+            <a:avLst/>
+          </a:prstGeom>
+          <a:noFill/>
+          <a:ln>
+            <a:noFill/>
+          </a:ln>
+          <a:extLst>
+            <a:ext uri="{909E8E84-426E-40DD-AFC4-6F175D3DCCD1}">
+              <a14:hiddenFill xmlns:a14="http://schemas.microsoft.com/office/drawing/2010/main">
+                <a:solidFill>
+                  <a:srgbClr val="FFFFFF"/>
+                </a:solidFill>
+              </a14:hiddenFill>
+            </a:ext>
+            <a:ext uri="{91240B29-F687-4F45-9708-019B960494DF}">
+              <a14:hiddenLine xmlns:a14="http://schemas.microsoft.com/office/drawing/2010/main" w="9525">
+                <a:solidFill>
+                  <a:srgbClr val="000000"/>
+                </a:solidFill>
+                <a:miter lim="800000"/>
+                <a:headEnd/>
+                <a:tailEnd/>
+              </a14:hiddenLine>
+            </a:ext>
+          </a:extLst>
+        </p:spPr>
+      </p:pic>
+      <p:sp>
+        <p:nvSpPr>
+          <p:cNvPr id="137" name="TextBox 136"/>
+          <p:cNvSpPr txBox="1"/>
+          <p:nvPr/>
+        </p:nvSpPr>
+        <p:spPr>
+          <a:xfrm>
+            <a:off x="7297738" y="5637143"/>
+            <a:ext cx="946670" cy="238363"/>
+          </a:xfrm>
+          <a:prstGeom prst="roundRect">
+            <a:avLst/>
+          </a:prstGeom>
+          <a:noFill/>
+          <a:ln w="3175">
+            <a:noFill/>
+          </a:ln>
+        </p:spPr>
+        <p:txBody>
+          <a:bodyPr wrap="none" lIns="36000" tIns="0" rIns="36000" bIns="0" rtlCol="0" anchor="ctr" anchorCtr="0">
+            <a:spAutoFit/>
+          </a:bodyPr>
+          <a:lstStyle/>
+          <a:p>
+            <a:pPr algn="ctr"/>
+            <a:r>
+              <a:rPr lang="en-US" sz="1400" i="1" dirty="0" smtClean="0">
+                <a:solidFill>
+                  <a:schemeClr val="accent6">
+                    <a:lumMod val="50000"/>
+                  </a:schemeClr>
+                </a:solidFill>
+                <a:latin typeface="Arial" panose="020B0604020202020204" pitchFamily="34" charset="0"/>
+                <a:cs typeface="Arial" panose="020B0604020202020204" pitchFamily="34" charset="0"/>
+              </a:rPr>
+              <a:t>Decryption</a:t>
+            </a:r>
+            <a:endParaRPr lang="en-US" sz="1400" dirty="0">
+              <a:latin typeface="Arial" panose="020B0604020202020204" pitchFamily="34" charset="0"/>
+              <a:cs typeface="Arial" panose="020B0604020202020204" pitchFamily="34" charset="0"/>
+            </a:endParaRPr>
+          </a:p>
+        </p:txBody>
+      </p:sp>
+      <p:sp>
+        <p:nvSpPr>
+          <p:cNvPr id="139" name="TextBox 138"/>
+          <p:cNvSpPr txBox="1"/>
+          <p:nvPr/>
+        </p:nvSpPr>
+        <p:spPr>
+          <a:xfrm>
+            <a:off x="986402" y="5633047"/>
+            <a:ext cx="855166" cy="238363"/>
+          </a:xfrm>
+          <a:prstGeom prst="roundRect">
+            <a:avLst/>
+          </a:prstGeom>
+          <a:noFill/>
+          <a:ln w="3175">
+            <a:noFill/>
+          </a:ln>
+        </p:spPr>
+        <p:txBody>
+          <a:bodyPr wrap="none" lIns="36000" tIns="0" rIns="36000" bIns="0" rtlCol="0" anchor="ctr" anchorCtr="0">
+            <a:spAutoFit/>
+          </a:bodyPr>
+          <a:lstStyle/>
+          <a:p>
+            <a:pPr algn="ctr"/>
+            <a:r>
+              <a:rPr lang="en-US" sz="1400" i="1" dirty="0" smtClean="0">
+                <a:solidFill>
+                  <a:schemeClr val="accent6">
+                    <a:lumMod val="50000"/>
+                  </a:schemeClr>
+                </a:solidFill>
+                <a:latin typeface="Arial" panose="020B0604020202020204" pitchFamily="34" charset="0"/>
+                <a:cs typeface="Arial" panose="020B0604020202020204" pitchFamily="34" charset="0"/>
+              </a:rPr>
+              <a:t>Signature</a:t>
+            </a:r>
+            <a:endParaRPr lang="en-US" sz="1400" dirty="0">
+              <a:latin typeface="Arial" panose="020B0604020202020204" pitchFamily="34" charset="0"/>
+              <a:cs typeface="Arial" panose="020B0604020202020204" pitchFamily="34" charset="0"/>
+            </a:endParaRPr>
+          </a:p>
+        </p:txBody>
+      </p:sp>
+      <p:sp>
+        <p:nvSpPr>
+          <p:cNvPr id="140" name="TextBox 139"/>
+          <p:cNvSpPr txBox="1"/>
+          <p:nvPr/>
+        </p:nvSpPr>
+        <p:spPr>
+          <a:xfrm>
+            <a:off x="1599008" y="3519681"/>
+            <a:ext cx="855166" cy="238363"/>
+          </a:xfrm>
+          <a:prstGeom prst="roundRect">
+            <a:avLst/>
+          </a:prstGeom>
+          <a:noFill/>
+          <a:ln w="3175">
+            <a:noFill/>
+          </a:ln>
+        </p:spPr>
+        <p:txBody>
+          <a:bodyPr wrap="none" lIns="36000" tIns="0" rIns="36000" bIns="0" rtlCol="0" anchor="ctr" anchorCtr="0">
+            <a:spAutoFit/>
+          </a:bodyPr>
+          <a:lstStyle/>
+          <a:p>
+            <a:pPr algn="ctr"/>
+            <a:r>
+              <a:rPr lang="en-US" sz="1400" i="1" dirty="0" smtClean="0">
+                <a:solidFill>
+                  <a:schemeClr val="accent6">
+                    <a:lumMod val="50000"/>
+                  </a:schemeClr>
+                </a:solidFill>
+                <a:latin typeface="Arial" panose="020B0604020202020204" pitchFamily="34" charset="0"/>
+                <a:cs typeface="Arial" panose="020B0604020202020204" pitchFamily="34" charset="0"/>
+              </a:rPr>
+              <a:t>Signature</a:t>
+            </a:r>
+            <a:endParaRPr lang="en-US" sz="1400" dirty="0">
+              <a:latin typeface="Arial" panose="020B0604020202020204" pitchFamily="34" charset="0"/>
+              <a:cs typeface="Arial" panose="020B0604020202020204" pitchFamily="34" charset="0"/>
+            </a:endParaRPr>
+          </a:p>
+        </p:txBody>
+      </p:sp>
+      <p:sp>
+        <p:nvSpPr>
+          <p:cNvPr id="13" name="Rectangle 12"/>
+          <p:cNvSpPr/>
+          <p:nvPr/>
+        </p:nvSpPr>
+        <p:spPr>
+          <a:xfrm>
+            <a:off x="8092270" y="3667394"/>
+            <a:ext cx="309462" cy="2088930"/>
+          </a:xfrm>
+          <a:custGeom>
+            <a:avLst/>
+            <a:gdLst>
+              <a:gd name="connsiteX0" fmla="*/ 0 w 792088"/>
+              <a:gd name="connsiteY0" fmla="*/ 0 h 2337825"/>
+              <a:gd name="connsiteX1" fmla="*/ 792088 w 792088"/>
+              <a:gd name="connsiteY1" fmla="*/ 0 h 2337825"/>
+              <a:gd name="connsiteX2" fmla="*/ 792088 w 792088"/>
+              <a:gd name="connsiteY2" fmla="*/ 2337825 h 2337825"/>
+              <a:gd name="connsiteX3" fmla="*/ 0 w 792088"/>
+              <a:gd name="connsiteY3" fmla="*/ 2337825 h 2337825"/>
+              <a:gd name="connsiteX4" fmla="*/ 0 w 792088"/>
+              <a:gd name="connsiteY4" fmla="*/ 0 h 2337825"/>
+              <a:gd name="connsiteX0" fmla="*/ 0 w 792088"/>
+              <a:gd name="connsiteY0" fmla="*/ 0 h 2337825"/>
+              <a:gd name="connsiteX1" fmla="*/ 792088 w 792088"/>
+              <a:gd name="connsiteY1" fmla="*/ 0 h 2337825"/>
+              <a:gd name="connsiteX2" fmla="*/ 792088 w 792088"/>
+              <a:gd name="connsiteY2" fmla="*/ 2337825 h 2337825"/>
+              <a:gd name="connsiteX3" fmla="*/ 0 w 792088"/>
+              <a:gd name="connsiteY3" fmla="*/ 2337825 h 2337825"/>
+              <a:gd name="connsiteX4" fmla="*/ 91440 w 792088"/>
+              <a:gd name="connsiteY4" fmla="*/ 91440 h 2337825"/>
+              <a:gd name="connsiteX0" fmla="*/ 0 w 792088"/>
+              <a:gd name="connsiteY0" fmla="*/ 0 h 2337825"/>
+              <a:gd name="connsiteX1" fmla="*/ 792088 w 792088"/>
+              <a:gd name="connsiteY1" fmla="*/ 0 h 2337825"/>
+              <a:gd name="connsiteX2" fmla="*/ 792088 w 792088"/>
+              <a:gd name="connsiteY2" fmla="*/ 2337825 h 2337825"/>
+              <a:gd name="connsiteX3" fmla="*/ 0 w 792088"/>
+              <a:gd name="connsiteY3" fmla="*/ 2337825 h 2337825"/>
+              <a:gd name="connsiteX0" fmla="*/ 0 w 792088"/>
+              <a:gd name="connsiteY0" fmla="*/ 0 h 2337825"/>
+              <a:gd name="connsiteX1" fmla="*/ 792088 w 792088"/>
+              <a:gd name="connsiteY1" fmla="*/ 0 h 2337825"/>
+              <a:gd name="connsiteX2" fmla="*/ 792088 w 792088"/>
+              <a:gd name="connsiteY2" fmla="*/ 2337825 h 2337825"/>
+              <a:gd name="connsiteX3" fmla="*/ 307776 w 792088"/>
+              <a:gd name="connsiteY3" fmla="*/ 2337825 h 2337825"/>
+              <a:gd name="connsiteX0" fmla="*/ 0 w 792088"/>
+              <a:gd name="connsiteY0" fmla="*/ 0 h 2337825"/>
+              <a:gd name="connsiteX1" fmla="*/ 792088 w 792088"/>
+              <a:gd name="connsiteY1" fmla="*/ 0 h 2337825"/>
+              <a:gd name="connsiteX2" fmla="*/ 792088 w 792088"/>
+              <a:gd name="connsiteY2" fmla="*/ 2337825 h 2337825"/>
+              <a:gd name="connsiteX3" fmla="*/ 307776 w 792088"/>
+              <a:gd name="connsiteY3" fmla="*/ 2337825 h 2337825"/>
+              <a:gd name="connsiteX0" fmla="*/ 0 w 1031104"/>
+              <a:gd name="connsiteY0" fmla="*/ 0 h 2337825"/>
+              <a:gd name="connsiteX1" fmla="*/ 1031104 w 1031104"/>
+              <a:gd name="connsiteY1" fmla="*/ 0 h 2337825"/>
+              <a:gd name="connsiteX2" fmla="*/ 1031104 w 1031104"/>
+              <a:gd name="connsiteY2" fmla="*/ 2337825 h 2337825"/>
+              <a:gd name="connsiteX3" fmla="*/ 546792 w 1031104"/>
+              <a:gd name="connsiteY3" fmla="*/ 2337825 h 2337825"/>
+              <a:gd name="connsiteX0" fmla="*/ 0 w 1031104"/>
+              <a:gd name="connsiteY0" fmla="*/ 0 h 2337825"/>
+              <a:gd name="connsiteX1" fmla="*/ 1031104 w 1031104"/>
+              <a:gd name="connsiteY1" fmla="*/ 0 h 2337825"/>
+              <a:gd name="connsiteX2" fmla="*/ 1031104 w 1031104"/>
+              <a:gd name="connsiteY2" fmla="*/ 2337825 h 2337825"/>
+              <a:gd name="connsiteX3" fmla="*/ 546792 w 1031104"/>
+              <a:gd name="connsiteY3" fmla="*/ 2337825 h 2337825"/>
+              <a:gd name="connsiteX0" fmla="*/ 0 w 847748"/>
+              <a:gd name="connsiteY0" fmla="*/ 0 h 2337825"/>
+              <a:gd name="connsiteX1" fmla="*/ 847748 w 847748"/>
+              <a:gd name="connsiteY1" fmla="*/ 0 h 2337825"/>
+              <a:gd name="connsiteX2" fmla="*/ 847748 w 847748"/>
+              <a:gd name="connsiteY2" fmla="*/ 2337825 h 2337825"/>
+              <a:gd name="connsiteX3" fmla="*/ 363436 w 847748"/>
+              <a:gd name="connsiteY3" fmla="*/ 2337825 h 2337825"/>
+              <a:gd name="connsiteX0" fmla="*/ 0 w 824827"/>
+              <a:gd name="connsiteY0" fmla="*/ 2665 h 2337825"/>
+              <a:gd name="connsiteX1" fmla="*/ 824827 w 824827"/>
+              <a:gd name="connsiteY1" fmla="*/ 0 h 2337825"/>
+              <a:gd name="connsiteX2" fmla="*/ 824827 w 824827"/>
+              <a:gd name="connsiteY2" fmla="*/ 2337825 h 2337825"/>
+              <a:gd name="connsiteX3" fmla="*/ 340515 w 824827"/>
+              <a:gd name="connsiteY3" fmla="*/ 2337825 h 2337825"/>
+              <a:gd name="connsiteX0" fmla="*/ 0 w 808456"/>
+              <a:gd name="connsiteY0" fmla="*/ 0 h 2337825"/>
+              <a:gd name="connsiteX1" fmla="*/ 808456 w 808456"/>
+              <a:gd name="connsiteY1" fmla="*/ 0 h 2337825"/>
+              <a:gd name="connsiteX2" fmla="*/ 808456 w 808456"/>
+              <a:gd name="connsiteY2" fmla="*/ 2337825 h 2337825"/>
+              <a:gd name="connsiteX3" fmla="*/ 324144 w 808456"/>
+              <a:gd name="connsiteY3" fmla="*/ 2337825 h 2337825"/>
+              <a:gd name="connsiteX0" fmla="*/ 0 w 808456"/>
+              <a:gd name="connsiteY0" fmla="*/ 0 h 2337825"/>
+              <a:gd name="connsiteX1" fmla="*/ 808456 w 808456"/>
+              <a:gd name="connsiteY1" fmla="*/ 0 h 2337825"/>
+              <a:gd name="connsiteX2" fmla="*/ 808456 w 808456"/>
+              <a:gd name="connsiteY2" fmla="*/ 2337825 h 2337825"/>
+              <a:gd name="connsiteX3" fmla="*/ 324144 w 808456"/>
+              <a:gd name="connsiteY3" fmla="*/ 2337825 h 2337825"/>
+              <a:gd name="connsiteX0" fmla="*/ 0 w 851021"/>
+              <a:gd name="connsiteY0" fmla="*/ 1333 h 2337825"/>
+              <a:gd name="connsiteX1" fmla="*/ 851021 w 851021"/>
+              <a:gd name="connsiteY1" fmla="*/ 0 h 2337825"/>
+              <a:gd name="connsiteX2" fmla="*/ 851021 w 851021"/>
+              <a:gd name="connsiteY2" fmla="*/ 2337825 h 2337825"/>
+              <a:gd name="connsiteX3" fmla="*/ 366709 w 851021"/>
+              <a:gd name="connsiteY3" fmla="*/ 2337825 h 2337825"/>
+            </a:gdLst>
+            <a:ahLst/>
+            <a:cxnLst>
+              <a:cxn ang="0">
+                <a:pos x="connsiteX0" y="connsiteY0"/>
+              </a:cxn>
+              <a:cxn ang="0">
+                <a:pos x="connsiteX1" y="connsiteY1"/>
+              </a:cxn>
+              <a:cxn ang="0">
+                <a:pos x="connsiteX2" y="connsiteY2"/>
+              </a:cxn>
+              <a:cxn ang="0">
+                <a:pos x="connsiteX3" y="connsiteY3"/>
+              </a:cxn>
+            </a:cxnLst>
+            <a:rect l="l" t="t" r="r" b="b"/>
+            <a:pathLst>
+              <a:path w="851021" h="2337825">
+                <a:moveTo>
+                  <a:pt x="0" y="1333"/>
+                </a:moveTo>
+                <a:lnTo>
+                  <a:pt x="851021" y="0"/>
+                </a:lnTo>
+                <a:lnTo>
+                  <a:pt x="851021" y="2337825"/>
+                </a:lnTo>
+                <a:lnTo>
+                  <a:pt x="366709" y="2337825"/>
+                </a:lnTo>
+              </a:path>
+            </a:pathLst>
+          </a:custGeom>
+          <a:noFill/>
+          <a:ln w="3175">
+            <a:solidFill>
+              <a:schemeClr val="tx1"/>
+            </a:solidFill>
+          </a:ln>
+        </p:spPr>
+        <p:style>
+          <a:lnRef idx="2">
+            <a:schemeClr val="accent1">
+              <a:shade val="50000"/>
+            </a:schemeClr>
+          </a:lnRef>
+          <a:fillRef idx="1">
+            <a:schemeClr val="accent1"/>
+          </a:fillRef>
+          <a:effectRef idx="0">
+            <a:schemeClr val="accent1"/>
+          </a:effectRef>
+          <a:fontRef idx="minor">
+            <a:schemeClr val="lt1"/>
+          </a:fontRef>
+        </p:style>
+        <p:txBody>
+          <a:bodyPr rtlCol="0" anchor="ctr"/>
+          <a:lstStyle/>
+          <a:p>
+            <a:pPr algn="ctr"/>
+            <a:endParaRPr lang="en-US" dirty="0"/>
           </a:p>
         </p:txBody>
       </p:sp>

</xml_diff>

<commit_message>
Protocol change (payment request signature removed)
</commit_message>
<xml_diff>
--- a/saturn/enhanced-four-corner-model.pptx
+++ b/saturn/enhanced-four-corner-model.pptx
@@ -288,7 +288,7 @@
           <a:p>
             <a:fld id="{FC080E38-6FF2-48B3-BDAB-4FA23B840E92}" type="datetimeFigureOut">
               <a:rPr lang="en-US" smtClean="0"/>
-              <a:t>2019-09-09</a:t>
+              <a:t>2019-09-14</a:t>
             </a:fld>
             <a:endParaRPr lang="en-US"/>
           </a:p>
@@ -458,7 +458,7 @@
           <a:p>
             <a:fld id="{FC080E38-6FF2-48B3-BDAB-4FA23B840E92}" type="datetimeFigureOut">
               <a:rPr lang="en-US" smtClean="0"/>
-              <a:t>2019-09-09</a:t>
+              <a:t>2019-09-14</a:t>
             </a:fld>
             <a:endParaRPr lang="en-US"/>
           </a:p>
@@ -638,7 +638,7 @@
           <a:p>
             <a:fld id="{FC080E38-6FF2-48B3-BDAB-4FA23B840E92}" type="datetimeFigureOut">
               <a:rPr lang="en-US" smtClean="0"/>
-              <a:t>2019-09-09</a:t>
+              <a:t>2019-09-14</a:t>
             </a:fld>
             <a:endParaRPr lang="en-US"/>
           </a:p>
@@ -808,7 +808,7 @@
           <a:p>
             <a:fld id="{FC080E38-6FF2-48B3-BDAB-4FA23B840E92}" type="datetimeFigureOut">
               <a:rPr lang="en-US" smtClean="0"/>
-              <a:t>2019-09-09</a:t>
+              <a:t>2019-09-14</a:t>
             </a:fld>
             <a:endParaRPr lang="en-US"/>
           </a:p>
@@ -1054,7 +1054,7 @@
           <a:p>
             <a:fld id="{FC080E38-6FF2-48B3-BDAB-4FA23B840E92}" type="datetimeFigureOut">
               <a:rPr lang="en-US" smtClean="0"/>
-              <a:t>2019-09-09</a:t>
+              <a:t>2019-09-14</a:t>
             </a:fld>
             <a:endParaRPr lang="en-US"/>
           </a:p>
@@ -1342,7 +1342,7 @@
           <a:p>
             <a:fld id="{FC080E38-6FF2-48B3-BDAB-4FA23B840E92}" type="datetimeFigureOut">
               <a:rPr lang="en-US" smtClean="0"/>
-              <a:t>2019-09-09</a:t>
+              <a:t>2019-09-14</a:t>
             </a:fld>
             <a:endParaRPr lang="en-US"/>
           </a:p>
@@ -1764,7 +1764,7 @@
           <a:p>
             <a:fld id="{FC080E38-6FF2-48B3-BDAB-4FA23B840E92}" type="datetimeFigureOut">
               <a:rPr lang="en-US" smtClean="0"/>
-              <a:t>2019-09-09</a:t>
+              <a:t>2019-09-14</a:t>
             </a:fld>
             <a:endParaRPr lang="en-US"/>
           </a:p>
@@ -1882,7 +1882,7 @@
           <a:p>
             <a:fld id="{FC080E38-6FF2-48B3-BDAB-4FA23B840E92}" type="datetimeFigureOut">
               <a:rPr lang="en-US" smtClean="0"/>
-              <a:t>2019-09-09</a:t>
+              <a:t>2019-09-14</a:t>
             </a:fld>
             <a:endParaRPr lang="en-US"/>
           </a:p>
@@ -1977,7 +1977,7 @@
           <a:p>
             <a:fld id="{FC080E38-6FF2-48B3-BDAB-4FA23B840E92}" type="datetimeFigureOut">
               <a:rPr lang="en-US" smtClean="0"/>
-              <a:t>2019-09-09</a:t>
+              <a:t>2019-09-14</a:t>
             </a:fld>
             <a:endParaRPr lang="en-US"/>
           </a:p>
@@ -2254,7 +2254,7 @@
           <a:p>
             <a:fld id="{FC080E38-6FF2-48B3-BDAB-4FA23B840E92}" type="datetimeFigureOut">
               <a:rPr lang="en-US" smtClean="0"/>
-              <a:t>2019-09-09</a:t>
+              <a:t>2019-09-14</a:t>
             </a:fld>
             <a:endParaRPr lang="en-US"/>
           </a:p>
@@ -2507,7 +2507,7 @@
           <a:p>
             <a:fld id="{FC080E38-6FF2-48B3-BDAB-4FA23B840E92}" type="datetimeFigureOut">
               <a:rPr lang="en-US" smtClean="0"/>
-              <a:t>2019-09-09</a:t>
+              <a:t>2019-09-14</a:t>
             </a:fld>
             <a:endParaRPr lang="en-US"/>
           </a:p>
@@ -2720,7 +2720,7 @@
           <a:p>
             <a:fld id="{FC080E38-6FF2-48B3-BDAB-4FA23B840E92}" type="datetimeFigureOut">
               <a:rPr lang="en-US" smtClean="0"/>
-              <a:t>2019-09-09</a:t>
+              <a:t>2019-09-14</a:t>
             </a:fld>
             <a:endParaRPr lang="en-US"/>
           </a:p>
@@ -8438,8 +8438,8 @@
         </p:nvSpPr>
         <p:spPr>
           <a:xfrm>
-            <a:off x="2763143" y="2516967"/>
-            <a:ext cx="2197460" cy="252948"/>
+            <a:off x="3062262" y="2564904"/>
+            <a:ext cx="1599219" cy="252948"/>
           </a:xfrm>
           <a:prstGeom prst="roundRect">
             <a:avLst>
@@ -8465,23 +8465,18 @@
           <a:p>
             <a:pPr algn="ctr"/>
             <a:r>
-              <a:rPr lang="en-US" sz="1400" i="1" dirty="0" smtClean="0">
-                <a:solidFill>
-                  <a:schemeClr val="accent6">
-                    <a:lumMod val="50000"/>
-                  </a:schemeClr>
-                </a:solidFill>
-                <a:latin typeface="Arial" panose="020B0604020202020204" pitchFamily="34" charset="0"/>
-                <a:cs typeface="Arial" panose="020B0604020202020204" pitchFamily="34" charset="0"/>
-              </a:rPr>
-              <a:t>Signed </a:t>
-            </a:r>
-            <a:r>
               <a:rPr lang="en-US" sz="1400" dirty="0" smtClean="0">
                 <a:latin typeface="Arial" panose="020B0604020202020204" pitchFamily="34" charset="0"/>
                 <a:cs typeface="Arial" panose="020B0604020202020204" pitchFamily="34" charset="0"/>
               </a:rPr>
-              <a:t>Payment Request</a:t>
+              <a:t>Payment </a:t>
+            </a:r>
+            <a:r>
+              <a:rPr lang="en-US" sz="1400" dirty="0" smtClean="0">
+                <a:latin typeface="Arial" panose="020B0604020202020204" pitchFamily="34" charset="0"/>
+                <a:cs typeface="Arial" panose="020B0604020202020204" pitchFamily="34" charset="0"/>
+              </a:rPr>
+              <a:t>Request</a:t>
             </a:r>
             <a:endParaRPr lang="en-US" sz="1400" dirty="0">
               <a:latin typeface="Arial" panose="020B0604020202020204" pitchFamily="34" charset="0"/>
@@ -9421,7 +9416,7 @@
                 <a:latin typeface="Arial" panose="020B0604020202020204" pitchFamily="34" charset="0"/>
                 <a:cs typeface="Arial" panose="020B0604020202020204" pitchFamily="34" charset="0"/>
               </a:rPr>
-              <a:t>V0.97, </a:t>
+              <a:t>V0.98, </a:t>
             </a:r>
             <a:r>
               <a:rPr lang="en-US" sz="800" dirty="0" err="1" smtClean="0">
@@ -9431,11 +9426,18 @@
               <a:t>A.Rundgren</a:t>
             </a:r>
             <a:r>
-              <a:rPr lang="en-US" sz="800" dirty="0" smtClean="0">
+              <a:rPr lang="en-US" sz="800" smtClean="0">
                 <a:latin typeface="Arial" panose="020B0604020202020204" pitchFamily="34" charset="0"/>
                 <a:cs typeface="Arial" panose="020B0604020202020204" pitchFamily="34" charset="0"/>
               </a:rPr>
-              <a:t>, 2019-09-09</a:t>
+              <a:t>, </a:t>
+            </a:r>
+            <a:r>
+              <a:rPr lang="en-US" sz="800" smtClean="0">
+                <a:latin typeface="Arial" panose="020B0604020202020204" pitchFamily="34" charset="0"/>
+                <a:cs typeface="Arial" panose="020B0604020202020204" pitchFamily="34" charset="0"/>
+              </a:rPr>
+              <a:t>2019-09-14</a:t>
             </a:r>
             <a:endParaRPr lang="en-US" sz="800" dirty="0">
               <a:latin typeface="Arial" panose="020B0604020202020204" pitchFamily="34" charset="0"/>

</xml_diff>

<commit_message>
e4cm 1.0 + URL link to Saturn
</commit_message>
<xml_diff>
--- a/saturn/enhanced-four-corner-model.pptx
+++ b/saturn/enhanced-four-corner-model.pptx
@@ -9414,14 +9414,16 @@
       </p:sp>
       <p:pic>
         <p:nvPicPr>
-          <p:cNvPr id="121" name="Picture 120"/>
+          <p:cNvPr id="121" name="Picture 120">
+            <a:hlinkClick r:id="rId11" tooltip="Saturn"/>
+          </p:cNvPr>
           <p:cNvPicPr>
             <a:picLocks noChangeAspect="1"/>
           </p:cNvPicPr>
           <p:nvPr/>
         </p:nvPicPr>
         <p:blipFill>
-          <a:blip r:embed="rId11" cstate="print">
+          <a:blip r:embed="rId12" cstate="print">
             <a:extLst>
               <a:ext uri="{28A0092B-C50C-407E-A947-70E740481C1C}">
                 <a14:useLocalDpi xmlns:a14="http://schemas.microsoft.com/office/drawing/2010/main" val="0"/>

</xml_diff>